<commit_message>
added Screenshots der Tabellen
</commit_message>
<xml_diff>
--- a/Medienverwaltungsdatenbank Gruppe1.pptx
+++ b/Medienverwaltungsdatenbank Gruppe1.pptx
@@ -237,7 +237,7 @@
           <a:p>
             <a:fld id="{77D5EFAF-E70D-4EAB-8272-5C61B681CB4A}" type="datetimeFigureOut">
               <a:rPr lang="de-DE" smtClean="0"/>
-              <a:t>29.01.2025</a:t>
+              <a:t>30.01.2025</a:t>
             </a:fld>
             <a:endParaRPr lang="de-DE"/>
           </a:p>
@@ -419,7 +419,7 @@
             <a:fld id="{D3962EC7-0D43-44FC-9E1B-67DC9E990A5E}" type="datetimeFigureOut">
               <a:rPr lang="de-DE" smtClean="0"/>
               <a:pPr/>
-              <a:t>29.01.2025</a:t>
+              <a:t>30.01.2025</a:t>
             </a:fld>
             <a:endParaRPr lang="de-DE"/>
           </a:p>
@@ -5800,7 +5800,7 @@
           <a:p>
             <a:fld id="{8E4D871A-5D80-4C11-B3ED-C3CE1D227336}" type="datetime1">
               <a:rPr lang="de-DE" smtClean="0"/>
-              <a:t>29.01.2025</a:t>
+              <a:t>30.01.2025</a:t>
             </a:fld>
             <a:endParaRPr lang="de-DE"/>
           </a:p>
@@ -6028,7 +6028,7 @@
           <a:p>
             <a:fld id="{267ED303-FB57-488C-82D4-DF76186A07D3}" type="datetime1">
               <a:rPr lang="de-DE" smtClean="0"/>
-              <a:t>29.01.2025</a:t>
+              <a:t>30.01.2025</a:t>
             </a:fld>
             <a:endParaRPr lang="de-DE" dirty="0"/>
           </a:p>
@@ -6308,7 +6308,7 @@
           <a:p>
             <a:fld id="{B3324BE7-7F5A-494A-BD10-1C0163A30414}" type="datetime1">
               <a:rPr lang="de-DE" smtClean="0"/>
-              <a:t>29.01.2025</a:t>
+              <a:t>30.01.2025</a:t>
             </a:fld>
             <a:endParaRPr lang="de-DE" dirty="0"/>
           </a:p>
@@ -6578,7 +6578,7 @@
           <a:p>
             <a:fld id="{064A188B-21B4-4A8D-83C8-7E791F366FD9}" type="datetime1">
               <a:rPr lang="de-DE" smtClean="0"/>
-              <a:t>29.01.2025</a:t>
+              <a:t>30.01.2025</a:t>
             </a:fld>
             <a:endParaRPr lang="de-DE" dirty="0"/>
           </a:p>
@@ -6995,7 +6995,7 @@
           <a:p>
             <a:fld id="{5A5F09BD-03F5-4C49-80D7-3DA1C0A872D5}" type="datetime1">
               <a:rPr lang="de-DE" smtClean="0"/>
-              <a:t>29.01.2025</a:t>
+              <a:t>30.01.2025</a:t>
             </a:fld>
             <a:endParaRPr lang="de-DE" dirty="0"/>
           </a:p>
@@ -7141,7 +7141,7 @@
           <a:p>
             <a:fld id="{6026F39E-F7EC-4B84-9C37-8690984FE4D5}" type="datetime1">
               <a:rPr lang="de-DE" smtClean="0"/>
-              <a:t>29.01.2025</a:t>
+              <a:t>30.01.2025</a:t>
             </a:fld>
             <a:endParaRPr lang="de-DE" dirty="0"/>
           </a:p>
@@ -7259,7 +7259,7 @@
           <a:p>
             <a:fld id="{31418602-D941-4A49-9446-B64F5A22A085}" type="datetime1">
               <a:rPr lang="de-DE" smtClean="0"/>
-              <a:t>29.01.2025</a:t>
+              <a:t>30.01.2025</a:t>
             </a:fld>
             <a:endParaRPr lang="de-DE" dirty="0"/>
           </a:p>
@@ -7575,7 +7575,7 @@
           <a:p>
             <a:fld id="{03033249-D010-40F8-B47F-946F6814A06A}" type="datetime1">
               <a:rPr lang="de-DE" smtClean="0"/>
-              <a:t>29.01.2025</a:t>
+              <a:t>30.01.2025</a:t>
             </a:fld>
             <a:endParaRPr lang="de-DE" dirty="0"/>
           </a:p>
@@ -7868,7 +7868,7 @@
           <a:p>
             <a:fld id="{76585B8D-1870-4F78-BE2E-2699F501307D}" type="datetime1">
               <a:rPr lang="de-DE" smtClean="0"/>
-              <a:t>29.01.2025</a:t>
+              <a:t>30.01.2025</a:t>
             </a:fld>
             <a:endParaRPr lang="de-DE" dirty="0"/>
           </a:p>
@@ -8071,7 +8071,7 @@
           <a:p>
             <a:fld id="{4BF9EEE7-A2C7-4ACB-A34A-E88C67FBD696}" type="datetime1">
               <a:rPr lang="de-DE" smtClean="0"/>
-              <a:t>29.01.2025</a:t>
+              <a:t>30.01.2025</a:t>
             </a:fld>
             <a:endParaRPr lang="de-DE" dirty="0"/>
           </a:p>
@@ -8284,7 +8284,7 @@
           <a:p>
             <a:fld id="{691A7485-77A7-44E2-883A-FF8407A1A046}" type="datetime1">
               <a:rPr lang="de-DE" smtClean="0"/>
-              <a:t>29.01.2025</a:t>
+              <a:t>30.01.2025</a:t>
             </a:fld>
             <a:endParaRPr lang="de-DE" dirty="0"/>
           </a:p>
@@ -8432,7 +8432,7 @@
           <a:p>
             <a:fld id="{A4681764-CC49-4870-8B4A-58EBB06CE56E}" type="datetime1">
               <a:rPr lang="de-DE" smtClean="0"/>
-              <a:t>29.01.2025</a:t>
+              <a:t>30.01.2025</a:t>
             </a:fld>
             <a:endParaRPr lang="de-DE" dirty="0"/>
           </a:p>
@@ -8887,7 +8887,7 @@
           <a:p>
             <a:fld id="{A3B7E015-F6DD-469F-90E4-FB4A8C04FC0B}" type="datetime1">
               <a:rPr lang="de-DE" smtClean="0"/>
-              <a:t>29.01.2025</a:t>
+              <a:t>30.01.2025</a:t>
             </a:fld>
             <a:endParaRPr lang="de-DE" dirty="0"/>
           </a:p>
@@ -9342,7 +9342,7 @@
           <a:p>
             <a:fld id="{D2DAB08A-7767-47B3-9ABC-F251074A687B}" type="datetime1">
               <a:rPr lang="de-DE" smtClean="0"/>
-              <a:t>29.01.2025</a:t>
+              <a:t>30.01.2025</a:t>
             </a:fld>
             <a:endParaRPr lang="de-DE" dirty="0"/>
           </a:p>
@@ -9870,7 +9870,7 @@
           <a:p>
             <a:fld id="{6E224F6F-7879-40FC-901C-18BF6D42ED8D}" type="datetime1">
               <a:rPr lang="de-DE" smtClean="0"/>
-              <a:t>29.01.2025</a:t>
+              <a:t>30.01.2025</a:t>
             </a:fld>
             <a:endParaRPr lang="de-DE" dirty="0"/>
           </a:p>
@@ -10156,7 +10156,7 @@
           <a:p>
             <a:fld id="{C7A0F3EB-20A0-4500-8BD5-99B2F4FBEAA9}" type="datetime1">
               <a:rPr lang="de-DE" smtClean="0"/>
-              <a:t>29.01.2025</a:t>
+              <a:t>30.01.2025</a:t>
             </a:fld>
             <a:endParaRPr lang="de-DE" dirty="0"/>
           </a:p>
@@ -10611,7 +10611,7 @@
           <a:p>
             <a:fld id="{E9D597F0-980E-4A77-9D38-21E0C09079D3}" type="datetime1">
               <a:rPr lang="de-DE" smtClean="0"/>
-              <a:t>29.01.2025</a:t>
+              <a:t>30.01.2025</a:t>
             </a:fld>
             <a:endParaRPr lang="de-DE" dirty="0"/>
           </a:p>
@@ -11006,7 +11006,7 @@
           <a:p>
             <a:fld id="{6A6E7471-7EEB-432B-89A6-1AD99B0E46FF}" type="datetime1">
               <a:rPr lang="de-DE" smtClean="0"/>
-              <a:t>29.01.2025</a:t>
+              <a:t>30.01.2025</a:t>
             </a:fld>
             <a:endParaRPr lang="de-DE" dirty="0"/>
           </a:p>
@@ -11461,7 +11461,7 @@
           <a:p>
             <a:fld id="{5241AFB2-4563-40C8-B55A-8DF3E65E7F81}" type="datetime1">
               <a:rPr lang="de-DE" smtClean="0"/>
-              <a:t>29.01.2025</a:t>
+              <a:t>30.01.2025</a:t>
             </a:fld>
             <a:endParaRPr lang="de-DE" dirty="0"/>
           </a:p>
@@ -11933,7 +11933,7 @@
           <a:p>
             <a:fld id="{A66FA4F9-E427-452F-83F5-F8F1CC44DC41}" type="datetime1">
               <a:rPr lang="de-DE" smtClean="0"/>
-              <a:t>29.01.2025</a:t>
+              <a:t>30.01.2025</a:t>
             </a:fld>
             <a:endParaRPr lang="de-DE"/>
           </a:p>
@@ -12204,7 +12204,7 @@
           <a:p>
             <a:fld id="{03768D43-2635-4FA2-AABB-860D9CB8B160}" type="datetime1">
               <a:rPr lang="de-DE" smtClean="0"/>
-              <a:t>29.01.2025</a:t>
+              <a:t>30.01.2025</a:t>
             </a:fld>
             <a:endParaRPr lang="de-DE" dirty="0"/>
           </a:p>
@@ -12733,7 +12733,7 @@
           <a:p>
             <a:fld id="{606E70BA-FD79-466F-A344-6ED84EB9E5B8}" type="datetime1">
               <a:rPr lang="de-DE" smtClean="0"/>
-              <a:t>29.01.2025</a:t>
+              <a:t>30.01.2025</a:t>
             </a:fld>
             <a:endParaRPr lang="de-DE" dirty="0"/>
           </a:p>
@@ -13811,10 +13811,10 @@
       </p:sp>
       <p:sp>
         <p:nvSpPr>
-          <p:cNvPr id="4" name="Untertitel 2">
-            <a:extLst>
-              <a:ext uri="{FF2B5EF4-FFF2-40B4-BE49-F238E27FC236}">
-                <a16:creationId xmlns:a16="http://schemas.microsoft.com/office/drawing/2014/main" id="{D3D17AE4-F515-3AF8-BA95-BA4D63C3D0EF}"/>
+          <p:cNvPr id="5" name="Textplatzhalter 19">
+            <a:extLst>
+              <a:ext uri="{FF2B5EF4-FFF2-40B4-BE49-F238E27FC236}">
+                <a16:creationId xmlns:a16="http://schemas.microsoft.com/office/drawing/2014/main" id="{8C56FF10-4BFD-D879-E931-201320815EF4}"/>
               </a:ext>
             </a:extLst>
           </p:cNvPr>
@@ -13825,19 +13825,17 @@
         </p:nvSpPr>
         <p:spPr>
           <a:xfrm>
-            <a:off x="5191886" y="6176962"/>
-            <a:ext cx="2362198" cy="1528763"/>
+            <a:off x="4533899" y="6316363"/>
+            <a:ext cx="5029200" cy="588104"/>
           </a:xfrm>
           <a:prstGeom prst="rect">
             <a:avLst/>
           </a:prstGeom>
         </p:spPr>
         <p:txBody>
-          <a:bodyPr vert="horz" lIns="91440" tIns="45720" rIns="91440" bIns="45720" rtlCol="0">
-            <a:normAutofit/>
-          </a:bodyPr>
+          <a:bodyPr/>
           <a:lstStyle>
-            <a:lvl1pPr marL="0" indent="0" algn="ctr" defTabSz="914400" rtl="0" eaLnBrk="1" latinLnBrk="0" hangingPunct="1">
+            <a:lvl1pPr marL="228600" indent="-228600" algn="l" defTabSz="914400" rtl="0" eaLnBrk="1" latinLnBrk="0" hangingPunct="1">
               <a:lnSpc>
                 <a:spcPct val="90000"/>
               </a:lnSpc>
@@ -13845,8 +13843,8 @@
                 <a:spcPts val="1000"/>
               </a:spcBef>
               <a:buFont typeface="Arial" panose="020B0604020202020204" pitchFamily="34" charset="0"/>
-              <a:buNone/>
-              <a:defRPr sz="2400" kern="1200">
+              <a:buChar char="•"/>
+              <a:defRPr sz="2800" kern="1200">
                 <a:solidFill>
                   <a:schemeClr val="tx1"/>
                 </a:solidFill>
@@ -13855,7 +13853,7 @@
                 <a:cs typeface="+mn-cs"/>
               </a:defRPr>
             </a:lvl1pPr>
-            <a:lvl2pPr marL="457200" indent="0" algn="ctr" defTabSz="914400" rtl="0" eaLnBrk="1" latinLnBrk="0" hangingPunct="1">
+            <a:lvl2pPr marL="685800" indent="-228600" algn="l" defTabSz="914400" rtl="0" eaLnBrk="1" latinLnBrk="0" hangingPunct="1">
               <a:lnSpc>
                 <a:spcPct val="90000"/>
               </a:lnSpc>
@@ -13863,8 +13861,8 @@
                 <a:spcPts val="500"/>
               </a:spcBef>
               <a:buFont typeface="Arial" panose="020B0604020202020204" pitchFamily="34" charset="0"/>
-              <a:buNone/>
-              <a:defRPr sz="2000" kern="1200">
+              <a:buChar char="•"/>
+              <a:defRPr sz="2400" kern="1200">
                 <a:solidFill>
                   <a:schemeClr val="tx1"/>
                 </a:solidFill>
@@ -13873,7 +13871,7 @@
                 <a:cs typeface="+mn-cs"/>
               </a:defRPr>
             </a:lvl2pPr>
-            <a:lvl3pPr marL="914400" indent="0" algn="ctr" defTabSz="914400" rtl="0" eaLnBrk="1" latinLnBrk="0" hangingPunct="1">
+            <a:lvl3pPr marL="1143000" indent="-228600" algn="l" defTabSz="914400" rtl="0" eaLnBrk="1" latinLnBrk="0" hangingPunct="1">
               <a:lnSpc>
                 <a:spcPct val="90000"/>
               </a:lnSpc>
@@ -13881,8 +13879,8 @@
                 <a:spcPts val="500"/>
               </a:spcBef>
               <a:buFont typeface="Arial" panose="020B0604020202020204" pitchFamily="34" charset="0"/>
-              <a:buNone/>
-              <a:defRPr sz="1800" kern="1200">
+              <a:buChar char="•"/>
+              <a:defRPr sz="2000" kern="1200">
                 <a:solidFill>
                   <a:schemeClr val="tx1"/>
                 </a:solidFill>
@@ -13891,7 +13889,7 @@
                 <a:cs typeface="+mn-cs"/>
               </a:defRPr>
             </a:lvl3pPr>
-            <a:lvl4pPr marL="1371600" indent="0" algn="ctr" defTabSz="914400" rtl="0" eaLnBrk="1" latinLnBrk="0" hangingPunct="1">
+            <a:lvl4pPr marL="1600200" indent="-228600" algn="l" defTabSz="914400" rtl="0" eaLnBrk="1" latinLnBrk="0" hangingPunct="1">
               <a:lnSpc>
                 <a:spcPct val="90000"/>
               </a:lnSpc>
@@ -13899,8 +13897,8 @@
                 <a:spcPts val="500"/>
               </a:spcBef>
               <a:buFont typeface="Arial" panose="020B0604020202020204" pitchFamily="34" charset="0"/>
-              <a:buNone/>
-              <a:defRPr sz="1600" kern="1200">
+              <a:buChar char="•"/>
+              <a:defRPr sz="1800" kern="1200">
                 <a:solidFill>
                   <a:schemeClr val="tx1"/>
                 </a:solidFill>
@@ -13909,7 +13907,7 @@
                 <a:cs typeface="+mn-cs"/>
               </a:defRPr>
             </a:lvl4pPr>
-            <a:lvl5pPr marL="1828800" indent="0" algn="ctr" defTabSz="914400" rtl="0" eaLnBrk="1" latinLnBrk="0" hangingPunct="1">
+            <a:lvl5pPr marL="2057400" indent="-228600" algn="l" defTabSz="914400" rtl="0" eaLnBrk="1" latinLnBrk="0" hangingPunct="1">
               <a:lnSpc>
                 <a:spcPct val="90000"/>
               </a:lnSpc>
@@ -13917,8 +13915,8 @@
                 <a:spcPts val="500"/>
               </a:spcBef>
               <a:buFont typeface="Arial" panose="020B0604020202020204" pitchFamily="34" charset="0"/>
-              <a:buNone/>
-              <a:defRPr sz="1600" kern="1200">
+              <a:buChar char="•"/>
+              <a:defRPr sz="1800" kern="1200">
                 <a:solidFill>
                   <a:schemeClr val="tx1"/>
                 </a:solidFill>
@@ -13927,7 +13925,7 @@
                 <a:cs typeface="+mn-cs"/>
               </a:defRPr>
             </a:lvl5pPr>
-            <a:lvl6pPr marL="2286000" indent="0" algn="ctr" defTabSz="914400" rtl="0" eaLnBrk="1" latinLnBrk="0" hangingPunct="1">
+            <a:lvl6pPr marL="2514600" indent="-228600" algn="l" defTabSz="914400" rtl="0" eaLnBrk="1" latinLnBrk="0" hangingPunct="1">
               <a:lnSpc>
                 <a:spcPct val="90000"/>
               </a:lnSpc>
@@ -13935,8 +13933,8 @@
                 <a:spcPts val="500"/>
               </a:spcBef>
               <a:buFont typeface="Arial" panose="020B0604020202020204" pitchFamily="34" charset="0"/>
-              <a:buNone/>
-              <a:defRPr sz="1600" kern="1200">
+              <a:buChar char="•"/>
+              <a:defRPr sz="1800" kern="1200">
                 <a:solidFill>
                   <a:schemeClr val="tx1"/>
                 </a:solidFill>
@@ -13945,7 +13943,7 @@
                 <a:cs typeface="+mn-cs"/>
               </a:defRPr>
             </a:lvl6pPr>
-            <a:lvl7pPr marL="2743200" indent="0" algn="ctr" defTabSz="914400" rtl="0" eaLnBrk="1" latinLnBrk="0" hangingPunct="1">
+            <a:lvl7pPr marL="2971800" indent="-228600" algn="l" defTabSz="914400" rtl="0" eaLnBrk="1" latinLnBrk="0" hangingPunct="1">
               <a:lnSpc>
                 <a:spcPct val="90000"/>
               </a:lnSpc>
@@ -13953,8 +13951,8 @@
                 <a:spcPts val="500"/>
               </a:spcBef>
               <a:buFont typeface="Arial" panose="020B0604020202020204" pitchFamily="34" charset="0"/>
-              <a:buNone/>
-              <a:defRPr sz="1600" kern="1200">
+              <a:buChar char="•"/>
+              <a:defRPr sz="1800" kern="1200">
                 <a:solidFill>
                   <a:schemeClr val="tx1"/>
                 </a:solidFill>
@@ -13963,7 +13961,7 @@
                 <a:cs typeface="+mn-cs"/>
               </a:defRPr>
             </a:lvl7pPr>
-            <a:lvl8pPr marL="3200400" indent="0" algn="ctr" defTabSz="914400" rtl="0" eaLnBrk="1" latinLnBrk="0" hangingPunct="1">
+            <a:lvl8pPr marL="3429000" indent="-228600" algn="l" defTabSz="914400" rtl="0" eaLnBrk="1" latinLnBrk="0" hangingPunct="1">
               <a:lnSpc>
                 <a:spcPct val="90000"/>
               </a:lnSpc>
@@ -13971,8 +13969,8 @@
                 <a:spcPts val="500"/>
               </a:spcBef>
               <a:buFont typeface="Arial" panose="020B0604020202020204" pitchFamily="34" charset="0"/>
-              <a:buNone/>
-              <a:defRPr sz="1600" kern="1200">
+              <a:buChar char="•"/>
+              <a:defRPr sz="1800" kern="1200">
                 <a:solidFill>
                   <a:schemeClr val="tx1"/>
                 </a:solidFill>
@@ -13981,7 +13979,7 @@
                 <a:cs typeface="+mn-cs"/>
               </a:defRPr>
             </a:lvl8pPr>
-            <a:lvl9pPr marL="3657600" indent="0" algn="ctr" defTabSz="914400" rtl="0" eaLnBrk="1" latinLnBrk="0" hangingPunct="1">
+            <a:lvl9pPr marL="3886200" indent="-228600" algn="l" defTabSz="914400" rtl="0" eaLnBrk="1" latinLnBrk="0" hangingPunct="1">
               <a:lnSpc>
                 <a:spcPct val="90000"/>
               </a:lnSpc>
@@ -13989,8 +13987,8 @@
                 <a:spcPts val="500"/>
               </a:spcBef>
               <a:buFont typeface="Arial" panose="020B0604020202020204" pitchFamily="34" charset="0"/>
-              <a:buNone/>
-              <a:defRPr sz="1600" kern="1200">
+              <a:buChar char="•"/>
+              <a:defRPr sz="1800" kern="1200">
                 <a:solidFill>
                   <a:schemeClr val="tx1"/>
                 </a:solidFill>
@@ -14001,15 +13999,27 @@
             </a:lvl9pPr>
           </a:lstStyle>
           <a:p>
-            <a:pPr algn="l"/>
-            <a:r>
-              <a:rPr lang="en-US" sz="2000" dirty="0" err="1"/>
+            <a:pPr marL="0" indent="0">
+              <a:buNone/>
+            </a:pPr>
+            <a:r>
+              <a:rPr lang="de-DE" sz="1800" dirty="0"/>
+              <a:t>IT-Akademie Dr. Heuer, 31. </a:t>
+            </a:r>
+            <a:r>
+              <a:rPr lang="en-US" sz="1800" dirty="0" err="1"/>
               <a:t>Januar</a:t>
             </a:r>
             <a:r>
-              <a:rPr lang="en-US" sz="2000" dirty="0"/>
+              <a:rPr lang="en-US" sz="1800" dirty="0"/>
               <a:t> 2025</a:t>
             </a:r>
+          </a:p>
+          <a:p>
+            <a:pPr marL="0" indent="0">
+              <a:buNone/>
+            </a:pPr>
+            <a:endParaRPr lang="de-DE" sz="1800" dirty="0"/>
           </a:p>
         </p:txBody>
       </p:sp>
@@ -14564,7 +14574,7 @@
             <a:pPr algn="ctr"/>
             <a:fld id="{6DCE2E55-0611-429C-9DFA-BA78059032C7}" type="datetime1">
               <a:rPr lang="de-DE" smtClean="0"/>
-              <a:t>29.01.2025</a:t>
+              <a:t>30.01.2025</a:t>
             </a:fld>
             <a:endParaRPr lang="de-DE" dirty="0"/>
           </a:p>
@@ -15001,6 +15011,36 @@
           </a:p>
         </p:txBody>
       </p:sp>
+      <p:pic>
+        <p:nvPicPr>
+          <p:cNvPr id="17" name="Grafik 16">
+            <a:extLst>
+              <a:ext uri="{FF2B5EF4-FFF2-40B4-BE49-F238E27FC236}">
+                <a16:creationId xmlns:a16="http://schemas.microsoft.com/office/drawing/2014/main" id="{4F798B8E-49A2-8622-BDD6-989DE82B3423}"/>
+              </a:ext>
+            </a:extLst>
+          </p:cNvPr>
+          <p:cNvPicPr>
+            <a:picLocks noChangeAspect="1"/>
+          </p:cNvPicPr>
+          <p:nvPr/>
+        </p:nvPicPr>
+        <p:blipFill>
+          <a:blip r:embed="rId3"/>
+          <a:stretch>
+            <a:fillRect/>
+          </a:stretch>
+        </p:blipFill>
+        <p:spPr>
+          <a:xfrm>
+            <a:off x="3087168" y="1712495"/>
+            <a:ext cx="6031842" cy="4309747"/>
+          </a:xfrm>
+          <a:prstGeom prst="rect">
+            <a:avLst/>
+          </a:prstGeom>
+        </p:spPr>
+      </p:pic>
     </p:spTree>
     <p:extLst>
       <p:ext uri="{BB962C8B-B14F-4D97-AF65-F5344CB8AC3E}">
@@ -15552,7 +15592,7 @@
             <a:pPr algn="ctr"/>
             <a:fld id="{6DCE2E55-0611-429C-9DFA-BA78059032C7}" type="datetime1">
               <a:rPr lang="de-DE" smtClean="0"/>
-              <a:t>29.01.2025</a:t>
+              <a:t>30.01.2025</a:t>
             </a:fld>
             <a:endParaRPr lang="de-DE" dirty="0"/>
           </a:p>
@@ -16540,7 +16580,7 @@
             <a:pPr algn="ctr"/>
             <a:fld id="{6DCE2E55-0611-429C-9DFA-BA78059032C7}" type="datetime1">
               <a:rPr lang="de-DE" smtClean="0"/>
-              <a:t>29.01.2025</a:t>
+              <a:t>30.01.2025</a:t>
             </a:fld>
             <a:endParaRPr lang="de-DE" dirty="0"/>
           </a:p>
@@ -16803,11 +16843,41 @@
           <a:p>
             <a:r>
               <a:rPr lang="de-DE" dirty="0"/>
-              <a:t>Transaktionen</a:t>
-            </a:r>
-          </a:p>
-        </p:txBody>
-      </p:sp>
+              <a:t>Trigger</a:t>
+            </a:r>
+          </a:p>
+        </p:txBody>
+      </p:sp>
+      <p:pic>
+        <p:nvPicPr>
+          <p:cNvPr id="5" name="Grafik 4">
+            <a:extLst>
+              <a:ext uri="{FF2B5EF4-FFF2-40B4-BE49-F238E27FC236}">
+                <a16:creationId xmlns:a16="http://schemas.microsoft.com/office/drawing/2014/main" id="{CF84A689-86B6-7BD3-1738-06920D976BC1}"/>
+              </a:ext>
+            </a:extLst>
+          </p:cNvPr>
+          <p:cNvPicPr>
+            <a:picLocks noChangeAspect="1"/>
+          </p:cNvPicPr>
+          <p:nvPr/>
+        </p:nvPicPr>
+        <p:blipFill>
+          <a:blip r:embed="rId3"/>
+          <a:stretch>
+            <a:fillRect/>
+          </a:stretch>
+        </p:blipFill>
+        <p:spPr>
+          <a:xfrm>
+            <a:off x="3746109" y="1676400"/>
+            <a:ext cx="4775982" cy="4271069"/>
+          </a:xfrm>
+          <a:prstGeom prst="rect">
+            <a:avLst/>
+          </a:prstGeom>
+        </p:spPr>
+      </p:pic>
     </p:spTree>
     <p:extLst>
       <p:ext uri="{BB962C8B-B14F-4D97-AF65-F5344CB8AC3E}">
@@ -17359,7 +17429,7 @@
             <a:pPr algn="ctr"/>
             <a:fld id="{6DCE2E55-0611-429C-9DFA-BA78059032C7}" type="datetime1">
               <a:rPr lang="de-DE" smtClean="0"/>
-              <a:t>29.01.2025</a:t>
+              <a:t>30.01.2025</a:t>
             </a:fld>
             <a:endParaRPr lang="de-DE" dirty="0"/>
           </a:p>
@@ -17655,27 +17725,19 @@
           <a:p>
             <a:r>
               <a:rPr lang="de-DE" dirty="0"/>
-              <a:t>Medientypen</a:t>
+              <a:t>Medientypen (z.B. Zeitschriften)</a:t>
             </a:r>
           </a:p>
           <a:p>
             <a:r>
               <a:rPr lang="de-DE" dirty="0"/>
-              <a:t>Attribute erweitern (</a:t>
-            </a:r>
-            <a:r>
-              <a:rPr lang="de-DE" dirty="0" err="1"/>
-              <a:t>actors</a:t>
-            </a:r>
+              <a:t>Attribute erweitern (z.B. Actors)</a:t>
+            </a:r>
+          </a:p>
+          <a:p>
             <a:r>
               <a:rPr lang="de-DE" dirty="0"/>
-              <a:t>)</a:t>
-            </a:r>
-          </a:p>
-          <a:p>
-            <a:r>
-              <a:rPr lang="de-DE" dirty="0"/>
-              <a:t>Benutzer-zugehörigkeit</a:t>
+              <a:t>Benutzer-Entity </a:t>
             </a:r>
           </a:p>
           <a:p>
@@ -18273,7 +18335,7 @@
             <a:pPr algn="ctr"/>
             <a:fld id="{6DCE2E55-0611-429C-9DFA-BA78059032C7}" type="datetime1">
               <a:rPr lang="de-DE" smtClean="0"/>
-              <a:t>29.01.2025</a:t>
+              <a:t>30.01.2025</a:t>
             </a:fld>
             <a:endParaRPr lang="de-DE" dirty="0"/>
           </a:p>
@@ -19027,7 +19089,7 @@
             <a:fld id="{78528F33-B51B-4692-8105-AFA8C2F7C22E}" type="datetime1">
               <a:rPr lang="de-DE" smtClean="0"/>
               <a:pPr algn="ctr"/>
-              <a:t>29.01.2025</a:t>
+              <a:t>30.01.2025</a:t>
             </a:fld>
             <a:endParaRPr lang="de-DE" dirty="0"/>
           </a:p>
@@ -20062,7 +20124,7 @@
             <a:pPr algn="ctr"/>
             <a:fld id="{6365D8CF-27D3-43A4-BBA3-052FBE53B27E}" type="datetime1">
               <a:rPr lang="de-DE" smtClean="0"/>
-              <a:t>29.01.2025</a:t>
+              <a:t>30.01.2025</a:t>
             </a:fld>
             <a:endParaRPr lang="de-DE" dirty="0"/>
           </a:p>
@@ -20580,33 +20642,6 @@
           </a:extLst>
         </p:spPr>
       </p:pic>
-      <p:sp>
-        <p:nvSpPr>
-          <p:cNvPr id="26" name="Titel 25">
-            <a:extLst>
-              <a:ext uri="{FF2B5EF4-FFF2-40B4-BE49-F238E27FC236}">
-                <a16:creationId xmlns:a16="http://schemas.microsoft.com/office/drawing/2014/main" id="{23C900A7-6FD9-9841-1CC7-DF5FD1B8240F}"/>
-              </a:ext>
-            </a:extLst>
-          </p:cNvPr>
-          <p:cNvSpPr>
-            <a:spLocks noGrp="1"/>
-          </p:cNvSpPr>
-          <p:nvPr>
-            <p:ph type="title"/>
-          </p:nvPr>
-        </p:nvSpPr>
-        <p:spPr/>
-        <p:txBody>
-          <a:bodyPr>
-            <a:normAutofit fontScale="90000"/>
-          </a:bodyPr>
-          <a:lstStyle/>
-          <a:p>
-            <a:endParaRPr lang="de-DE"/>
-          </a:p>
-        </p:txBody>
-      </p:sp>
       <p:sp>
         <p:nvSpPr>
           <p:cNvPr id="27" name="Textplatzhalter 19">
@@ -21357,7 +21392,7 @@
             <a:pPr algn="ctr"/>
             <a:fld id="{374E3A58-FB67-4F71-9C3A-917825C8FEC1}" type="datetime1">
               <a:rPr lang="de-DE" smtClean="0"/>
-              <a:t>29.01.2025</a:t>
+              <a:t>30.01.2025</a:t>
             </a:fld>
             <a:endParaRPr lang="de-DE" dirty="0"/>
           </a:p>
@@ -21464,33 +21499,6 @@
           </a:prstGeom>
         </p:spPr>
       </p:pic>
-      <p:sp>
-        <p:nvSpPr>
-          <p:cNvPr id="17" name="Titel 16">
-            <a:extLst>
-              <a:ext uri="{FF2B5EF4-FFF2-40B4-BE49-F238E27FC236}">
-                <a16:creationId xmlns:a16="http://schemas.microsoft.com/office/drawing/2014/main" id="{675D2D45-1CB5-CC3F-6953-4BDDA693057E}"/>
-              </a:ext>
-            </a:extLst>
-          </p:cNvPr>
-          <p:cNvSpPr>
-            <a:spLocks noGrp="1"/>
-          </p:cNvSpPr>
-          <p:nvPr>
-            <p:ph type="title"/>
-          </p:nvPr>
-        </p:nvSpPr>
-        <p:spPr/>
-        <p:txBody>
-          <a:bodyPr>
-            <a:normAutofit fontScale="90000"/>
-          </a:bodyPr>
-          <a:lstStyle/>
-          <a:p>
-            <a:endParaRPr lang="de-DE"/>
-          </a:p>
-        </p:txBody>
-      </p:sp>
       <p:sp>
         <p:nvSpPr>
           <p:cNvPr id="18" name="Textplatzhalter 19">
@@ -22241,7 +22249,7 @@
             <a:pPr algn="ctr"/>
             <a:fld id="{0953343C-08E3-417E-ABC9-2F51F6F24065}" type="datetime1">
               <a:rPr lang="de-DE" smtClean="0"/>
-              <a:t>29.01.2025</a:t>
+              <a:t>30.01.2025</a:t>
             </a:fld>
             <a:endParaRPr lang="de-DE" dirty="0"/>
           </a:p>
@@ -22348,33 +22356,6 @@
           </a:prstGeom>
         </p:spPr>
       </p:pic>
-      <p:sp>
-        <p:nvSpPr>
-          <p:cNvPr id="19" name="Titel 18">
-            <a:extLst>
-              <a:ext uri="{FF2B5EF4-FFF2-40B4-BE49-F238E27FC236}">
-                <a16:creationId xmlns:a16="http://schemas.microsoft.com/office/drawing/2014/main" id="{8AFD3121-0315-2E80-4B09-7197CC3D32F3}"/>
-              </a:ext>
-            </a:extLst>
-          </p:cNvPr>
-          <p:cNvSpPr>
-            <a:spLocks noGrp="1"/>
-          </p:cNvSpPr>
-          <p:nvPr>
-            <p:ph type="title"/>
-          </p:nvPr>
-        </p:nvSpPr>
-        <p:spPr/>
-        <p:txBody>
-          <a:bodyPr>
-            <a:normAutofit fontScale="90000"/>
-          </a:bodyPr>
-          <a:lstStyle/>
-          <a:p>
-            <a:endParaRPr lang="de-DE"/>
-          </a:p>
-        </p:txBody>
-      </p:sp>
       <p:sp>
         <p:nvSpPr>
           <p:cNvPr id="21" name="Textplatzhalter 19">
@@ -23125,7 +23106,7 @@
             <a:pPr algn="ctr"/>
             <a:fld id="{6DCE2E55-0611-429C-9DFA-BA78059032C7}" type="datetime1">
               <a:rPr lang="de-DE" smtClean="0"/>
-              <a:t>29.01.2025</a:t>
+              <a:t>30.01.2025</a:t>
             </a:fld>
             <a:endParaRPr lang="de-DE" dirty="0"/>
           </a:p>
@@ -23181,7 +23162,7 @@
         </p:blipFill>
         <p:spPr>
           <a:xfrm>
-            <a:off x="6072042" y="1263533"/>
+            <a:off x="6400800" y="1217304"/>
             <a:ext cx="4655640" cy="4876436"/>
           </a:xfrm>
           <a:prstGeom prst="rect">
@@ -23252,14 +23233,17 @@
         </p:nvSpPr>
         <p:spPr>
           <a:xfrm>
-            <a:off x="990600" y="2028825"/>
-            <a:ext cx="3999234" cy="949113"/>
+            <a:off x="2177598" y="5210960"/>
+            <a:ext cx="6019800" cy="949113"/>
           </a:xfrm>
         </p:spPr>
         <p:txBody>
           <a:bodyPr/>
           <a:lstStyle/>
           <a:p>
+            <a:pPr marL="0" indent="0">
+              <a:buNone/>
+            </a:pPr>
             <a:r>
               <a:rPr lang="de-DE" dirty="0"/>
               <a:t>zentrale Tabelle für alle Medientypen</a:t>
@@ -23267,53 +23251,6 @@
           </a:p>
         </p:txBody>
       </p:sp>
-      <p:pic>
-        <p:nvPicPr>
-          <p:cNvPr id="22" name="Picture 2">
-            <a:extLst>
-              <a:ext uri="{FF2B5EF4-FFF2-40B4-BE49-F238E27FC236}">
-                <a16:creationId xmlns:a16="http://schemas.microsoft.com/office/drawing/2014/main" id="{A8D9A848-3EF6-61F4-9952-76FBD72C62DD}"/>
-              </a:ext>
-            </a:extLst>
-          </p:cNvPr>
-          <p:cNvPicPr>
-            <a:picLocks noChangeAspect="1" noChangeArrowheads="1"/>
-          </p:cNvPicPr>
-          <p:nvPr/>
-        </p:nvPicPr>
-        <p:blipFill>
-          <a:blip r:embed="rId4" cstate="print">
-            <a:extLst>
-              <a:ext uri="{28A0092B-C50C-407E-A947-70E740481C1C}">
-                <a14:useLocalDpi xmlns:a14="http://schemas.microsoft.com/office/drawing/2010/main" val="0"/>
-              </a:ext>
-            </a:extLst>
-          </a:blip>
-          <a:srcRect/>
-          <a:stretch>
-            <a:fillRect/>
-          </a:stretch>
-        </p:blipFill>
-        <p:spPr bwMode="auto">
-          <a:xfrm>
-            <a:off x="1464401" y="3880063"/>
-            <a:ext cx="2852647" cy="1951764"/>
-          </a:xfrm>
-          <a:prstGeom prst="rect">
-            <a:avLst/>
-          </a:prstGeom>
-          <a:noFill/>
-          <a:extLst>
-            <a:ext uri="{909E8E84-426E-40DD-AFC4-6F175D3DCCD1}">
-              <a14:hiddenFill xmlns:a14="http://schemas.microsoft.com/office/drawing/2010/main">
-                <a:solidFill>
-                  <a:srgbClr val="FFFFFF"/>
-                </a:solidFill>
-              </a14:hiddenFill>
-            </a:ext>
-          </a:extLst>
-        </p:spPr>
-      </p:pic>
       <p:sp>
         <p:nvSpPr>
           <p:cNvPr id="24" name="Titel 23">
@@ -23540,6 +23477,36 @@
           </a:p>
         </p:txBody>
       </p:sp>
+      <p:pic>
+        <p:nvPicPr>
+          <p:cNvPr id="3" name="Grafik 2">
+            <a:extLst>
+              <a:ext uri="{FF2B5EF4-FFF2-40B4-BE49-F238E27FC236}">
+                <a16:creationId xmlns:a16="http://schemas.microsoft.com/office/drawing/2014/main" id="{980A64AF-0DCF-455C-7CEA-579F4A13899A}"/>
+              </a:ext>
+            </a:extLst>
+          </p:cNvPr>
+          <p:cNvPicPr>
+            <a:picLocks noChangeAspect="1"/>
+          </p:cNvPicPr>
+          <p:nvPr/>
+        </p:nvPicPr>
+        <p:blipFill>
+          <a:blip r:embed="rId4"/>
+          <a:stretch>
+            <a:fillRect/>
+          </a:stretch>
+        </p:blipFill>
+        <p:spPr>
+          <a:xfrm>
+            <a:off x="748400" y="1934561"/>
+            <a:ext cx="5211548" cy="2973308"/>
+          </a:xfrm>
+          <a:prstGeom prst="rect">
+            <a:avLst/>
+          </a:prstGeom>
+        </p:spPr>
+      </p:pic>
     </p:spTree>
     <p:extLst>
       <p:ext uri="{BB962C8B-B14F-4D97-AF65-F5344CB8AC3E}">
@@ -24323,7 +24290,7 @@
             <a:pPr algn="ctr"/>
             <a:fld id="{6DCE2E55-0611-429C-9DFA-BA78059032C7}" type="datetime1">
               <a:rPr lang="de-DE" smtClean="0"/>
-              <a:t>29.01.2025</a:t>
+              <a:t>30.01.2025</a:t>
             </a:fld>
             <a:endParaRPr lang="de-DE" dirty="0"/>
           </a:p>
@@ -24561,215 +24528,36 @@
           </a:p>
         </p:txBody>
       </p:sp>
-      <p:sp>
-        <p:nvSpPr>
-          <p:cNvPr id="35" name="Textplatzhalter 8">
-            <a:extLst>
-              <a:ext uri="{FF2B5EF4-FFF2-40B4-BE49-F238E27FC236}">
-                <a16:creationId xmlns:a16="http://schemas.microsoft.com/office/drawing/2014/main" id="{397F5D70-EB8A-EAD6-3793-C41E1BB978B6}"/>
-              </a:ext>
-            </a:extLst>
-          </p:cNvPr>
-          <p:cNvSpPr txBox="1">
-            <a:spLocks/>
-          </p:cNvSpPr>
+      <p:pic>
+        <p:nvPicPr>
+          <p:cNvPr id="3" name="Grafik 2">
+            <a:extLst>
+              <a:ext uri="{FF2B5EF4-FFF2-40B4-BE49-F238E27FC236}">
+                <a16:creationId xmlns:a16="http://schemas.microsoft.com/office/drawing/2014/main" id="{CE64A41B-526B-A328-CC92-5E0A95E6B02B}"/>
+              </a:ext>
+            </a:extLst>
+          </p:cNvPr>
+          <p:cNvPicPr>
+            <a:picLocks noChangeAspect="1"/>
+          </p:cNvPicPr>
           <p:nvPr/>
-        </p:nvSpPr>
+        </p:nvPicPr>
+        <p:blipFill>
+          <a:blip r:embed="rId4"/>
+          <a:stretch>
+            <a:fillRect/>
+          </a:stretch>
+        </p:blipFill>
         <p:spPr>
           <a:xfrm>
-            <a:off x="-659750" y="2987971"/>
-            <a:ext cx="8658516" cy="609600"/>
+            <a:off x="893604" y="1937491"/>
+            <a:ext cx="5856605" cy="3271621"/>
           </a:xfrm>
           <a:prstGeom prst="rect">
             <a:avLst/>
           </a:prstGeom>
         </p:spPr>
-        <p:txBody>
-          <a:bodyPr vert="horz" lIns="91440" tIns="45720" rIns="91440" bIns="45720" rtlCol="0">
-            <a:noAutofit/>
-          </a:bodyPr>
-          <a:lstStyle>
-            <a:lvl1pPr marL="0" indent="0" algn="ctr" defTabSz="914400" rtl="0" eaLnBrk="1" latinLnBrk="0" hangingPunct="1">
-              <a:lnSpc>
-                <a:spcPct val="90000"/>
-              </a:lnSpc>
-              <a:spcBef>
-                <a:spcPts val="1000"/>
-              </a:spcBef>
-              <a:buFont typeface="Arial" panose="020B0604020202020204" pitchFamily="34" charset="0"/>
-              <a:buNone/>
-              <a:tabLst/>
-              <a:defRPr sz="3200" u="sng" kern="1200">
-                <a:solidFill>
-                  <a:schemeClr val="tx1"/>
-                </a:solidFill>
-                <a:latin typeface="+mn-lt"/>
-                <a:ea typeface="+mn-ea"/>
-                <a:cs typeface="+mn-cs"/>
-              </a:defRPr>
-            </a:lvl1pPr>
-            <a:lvl2pPr marL="685800" indent="-228600" algn="l" defTabSz="914400" rtl="0" eaLnBrk="1" latinLnBrk="0" hangingPunct="1">
-              <a:lnSpc>
-                <a:spcPct val="90000"/>
-              </a:lnSpc>
-              <a:spcBef>
-                <a:spcPts val="500"/>
-              </a:spcBef>
-              <a:buFont typeface="Arial" panose="020B0604020202020204" pitchFamily="34" charset="0"/>
-              <a:buChar char="•"/>
-              <a:defRPr sz="2400" kern="1200">
-                <a:solidFill>
-                  <a:schemeClr val="tx1"/>
-                </a:solidFill>
-                <a:latin typeface="+mn-lt"/>
-                <a:ea typeface="+mn-ea"/>
-                <a:cs typeface="+mn-cs"/>
-              </a:defRPr>
-            </a:lvl2pPr>
-            <a:lvl3pPr marL="1143000" indent="-228600" algn="l" defTabSz="914400" rtl="0" eaLnBrk="1" latinLnBrk="0" hangingPunct="1">
-              <a:lnSpc>
-                <a:spcPct val="90000"/>
-              </a:lnSpc>
-              <a:spcBef>
-                <a:spcPts val="500"/>
-              </a:spcBef>
-              <a:buFont typeface="Arial" panose="020B0604020202020204" pitchFamily="34" charset="0"/>
-              <a:buChar char="•"/>
-              <a:defRPr sz="2000" kern="1200">
-                <a:solidFill>
-                  <a:schemeClr val="tx1"/>
-                </a:solidFill>
-                <a:latin typeface="+mn-lt"/>
-                <a:ea typeface="+mn-ea"/>
-                <a:cs typeface="+mn-cs"/>
-              </a:defRPr>
-            </a:lvl3pPr>
-            <a:lvl4pPr marL="1600200" indent="-228600" algn="l" defTabSz="914400" rtl="0" eaLnBrk="1" latinLnBrk="0" hangingPunct="1">
-              <a:lnSpc>
-                <a:spcPct val="90000"/>
-              </a:lnSpc>
-              <a:spcBef>
-                <a:spcPts val="500"/>
-              </a:spcBef>
-              <a:buFont typeface="Arial" panose="020B0604020202020204" pitchFamily="34" charset="0"/>
-              <a:buChar char="•"/>
-              <a:defRPr sz="1800" kern="1200">
-                <a:solidFill>
-                  <a:schemeClr val="tx1"/>
-                </a:solidFill>
-                <a:latin typeface="+mn-lt"/>
-                <a:ea typeface="+mn-ea"/>
-                <a:cs typeface="+mn-cs"/>
-              </a:defRPr>
-            </a:lvl4pPr>
-            <a:lvl5pPr marL="2057400" indent="-228600" algn="l" defTabSz="914400" rtl="0" eaLnBrk="1" latinLnBrk="0" hangingPunct="1">
-              <a:lnSpc>
-                <a:spcPct val="90000"/>
-              </a:lnSpc>
-              <a:spcBef>
-                <a:spcPts val="500"/>
-              </a:spcBef>
-              <a:buFont typeface="Arial" panose="020B0604020202020204" pitchFamily="34" charset="0"/>
-              <a:buChar char="•"/>
-              <a:defRPr sz="1800" kern="1200">
-                <a:solidFill>
-                  <a:schemeClr val="tx1"/>
-                </a:solidFill>
-                <a:latin typeface="+mn-lt"/>
-                <a:ea typeface="+mn-ea"/>
-                <a:cs typeface="+mn-cs"/>
-              </a:defRPr>
-            </a:lvl5pPr>
-            <a:lvl6pPr marL="2514600" indent="-228600" algn="l" defTabSz="914400" rtl="0" eaLnBrk="1" latinLnBrk="0" hangingPunct="1">
-              <a:lnSpc>
-                <a:spcPct val="90000"/>
-              </a:lnSpc>
-              <a:spcBef>
-                <a:spcPts val="500"/>
-              </a:spcBef>
-              <a:buFont typeface="Arial" panose="020B0604020202020204" pitchFamily="34" charset="0"/>
-              <a:buChar char="•"/>
-              <a:defRPr sz="1800" kern="1200">
-                <a:solidFill>
-                  <a:schemeClr val="tx1"/>
-                </a:solidFill>
-                <a:latin typeface="+mn-lt"/>
-                <a:ea typeface="+mn-ea"/>
-                <a:cs typeface="+mn-cs"/>
-              </a:defRPr>
-            </a:lvl6pPr>
-            <a:lvl7pPr marL="2971800" indent="-228600" algn="l" defTabSz="914400" rtl="0" eaLnBrk="1" latinLnBrk="0" hangingPunct="1">
-              <a:lnSpc>
-                <a:spcPct val="90000"/>
-              </a:lnSpc>
-              <a:spcBef>
-                <a:spcPts val="500"/>
-              </a:spcBef>
-              <a:buFont typeface="Arial" panose="020B0604020202020204" pitchFamily="34" charset="0"/>
-              <a:buChar char="•"/>
-              <a:defRPr sz="1800" kern="1200">
-                <a:solidFill>
-                  <a:schemeClr val="tx1"/>
-                </a:solidFill>
-                <a:latin typeface="+mn-lt"/>
-                <a:ea typeface="+mn-ea"/>
-                <a:cs typeface="+mn-cs"/>
-              </a:defRPr>
-            </a:lvl7pPr>
-            <a:lvl8pPr marL="3429000" indent="-228600" algn="l" defTabSz="914400" rtl="0" eaLnBrk="1" latinLnBrk="0" hangingPunct="1">
-              <a:lnSpc>
-                <a:spcPct val="90000"/>
-              </a:lnSpc>
-              <a:spcBef>
-                <a:spcPts val="500"/>
-              </a:spcBef>
-              <a:buFont typeface="Arial" panose="020B0604020202020204" pitchFamily="34" charset="0"/>
-              <a:buChar char="•"/>
-              <a:defRPr sz="1800" kern="1200">
-                <a:solidFill>
-                  <a:schemeClr val="tx1"/>
-                </a:solidFill>
-                <a:latin typeface="+mn-lt"/>
-                <a:ea typeface="+mn-ea"/>
-                <a:cs typeface="+mn-cs"/>
-              </a:defRPr>
-            </a:lvl8pPr>
-            <a:lvl9pPr marL="3886200" indent="-228600" algn="l" defTabSz="914400" rtl="0" eaLnBrk="1" latinLnBrk="0" hangingPunct="1">
-              <a:lnSpc>
-                <a:spcPct val="90000"/>
-              </a:lnSpc>
-              <a:spcBef>
-                <a:spcPts val="500"/>
-              </a:spcBef>
-              <a:buFont typeface="Arial" panose="020B0604020202020204" pitchFamily="34" charset="0"/>
-              <a:buChar char="•"/>
-              <a:defRPr sz="1800" kern="1200">
-                <a:solidFill>
-                  <a:schemeClr val="tx1"/>
-                </a:solidFill>
-                <a:latin typeface="+mn-lt"/>
-                <a:ea typeface="+mn-ea"/>
-                <a:cs typeface="+mn-cs"/>
-              </a:defRPr>
-            </a:lvl9pPr>
-          </a:lstStyle>
-          <a:p>
-            <a:r>
-              <a:rPr lang="de-DE" dirty="0"/>
-              <a:t>Platz für </a:t>
-            </a:r>
-            <a:r>
-              <a:rPr lang="de-DE" dirty="0" err="1"/>
-              <a:t>Tabellenscreenshot</a:t>
-            </a:r>
-            <a:endParaRPr lang="de-DE" dirty="0"/>
-          </a:p>
-          <a:p>
-            <a:pPr algn="l"/>
-            <a:endParaRPr lang="de-DE" dirty="0"/>
-          </a:p>
-        </p:txBody>
-      </p:sp>
+      </p:pic>
     </p:spTree>
     <p:extLst>
       <p:ext uri="{BB962C8B-B14F-4D97-AF65-F5344CB8AC3E}">
@@ -25321,7 +25109,7 @@
             <a:pPr algn="ctr"/>
             <a:fld id="{6DCE2E55-0611-429C-9DFA-BA78059032C7}" type="datetime1">
               <a:rPr lang="de-DE" smtClean="0"/>
-              <a:t>29.01.2025</a:t>
+              <a:t>30.01.2025</a:t>
             </a:fld>
             <a:endParaRPr lang="de-DE" dirty="0"/>
           </a:p>
@@ -26556,7 +26344,7 @@
             <a:pPr algn="ctr"/>
             <a:fld id="{6DCE2E55-0611-429C-9DFA-BA78059032C7}" type="datetime1">
               <a:rPr lang="de-DE" smtClean="0"/>
-              <a:t>29.01.2025</a:t>
+              <a:t>30.01.2025</a:t>
             </a:fld>
             <a:endParaRPr lang="de-DE" dirty="0"/>
           </a:p>
@@ -26987,6 +26775,234 @@
               <a:t>Übersicht: Views, Funktionen, Transaktionen, Trigger</a:t>
             </a:r>
           </a:p>
+          <a:p>
+            <a:pPr algn="l"/>
+            <a:endParaRPr lang="de-DE" dirty="0"/>
+          </a:p>
+        </p:txBody>
+      </p:sp>
+      <p:pic>
+        <p:nvPicPr>
+          <p:cNvPr id="5" name="Grafik 4">
+            <a:extLst>
+              <a:ext uri="{FF2B5EF4-FFF2-40B4-BE49-F238E27FC236}">
+                <a16:creationId xmlns:a16="http://schemas.microsoft.com/office/drawing/2014/main" id="{F8880B6C-66A9-E57F-4F43-A67525439BB8}"/>
+              </a:ext>
+            </a:extLst>
+          </p:cNvPr>
+          <p:cNvPicPr>
+            <a:picLocks noChangeAspect="1"/>
+          </p:cNvPicPr>
+          <p:nvPr/>
+        </p:nvPicPr>
+        <p:blipFill>
+          <a:blip r:embed="rId3"/>
+          <a:stretch>
+            <a:fillRect/>
+          </a:stretch>
+        </p:blipFill>
+        <p:spPr>
+          <a:xfrm>
+            <a:off x="619463" y="1676400"/>
+            <a:ext cx="1595312" cy="4279490"/>
+          </a:xfrm>
+          <a:prstGeom prst="rect">
+            <a:avLst/>
+          </a:prstGeom>
+        </p:spPr>
+      </p:pic>
+      <p:sp>
+        <p:nvSpPr>
+          <p:cNvPr id="6" name="Textplatzhalter 8">
+            <a:extLst>
+              <a:ext uri="{FF2B5EF4-FFF2-40B4-BE49-F238E27FC236}">
+                <a16:creationId xmlns:a16="http://schemas.microsoft.com/office/drawing/2014/main" id="{2CB9312D-B44B-6E14-5231-2F5EE7F39DD9}"/>
+              </a:ext>
+            </a:extLst>
+          </p:cNvPr>
+          <p:cNvSpPr txBox="1">
+            <a:spLocks/>
+          </p:cNvSpPr>
+          <p:nvPr/>
+        </p:nvSpPr>
+        <p:spPr>
+          <a:xfrm>
+            <a:off x="2890725" y="1872916"/>
+            <a:ext cx="6212270" cy="609600"/>
+          </a:xfrm>
+          <a:prstGeom prst="rect">
+            <a:avLst/>
+          </a:prstGeom>
+        </p:spPr>
+        <p:txBody>
+          <a:bodyPr vert="horz" lIns="91440" tIns="45720" rIns="91440" bIns="45720" rtlCol="0">
+            <a:noAutofit/>
+          </a:bodyPr>
+          <a:lstStyle>
+            <a:lvl1pPr marL="0" indent="0" algn="ctr" defTabSz="914400" rtl="0" eaLnBrk="1" latinLnBrk="0" hangingPunct="1">
+              <a:lnSpc>
+                <a:spcPct val="90000"/>
+              </a:lnSpc>
+              <a:spcBef>
+                <a:spcPts val="1000"/>
+              </a:spcBef>
+              <a:buFont typeface="Arial" panose="020B0604020202020204" pitchFamily="34" charset="0"/>
+              <a:buNone/>
+              <a:tabLst/>
+              <a:defRPr sz="3200" u="sng" kern="1200">
+                <a:solidFill>
+                  <a:schemeClr val="tx1"/>
+                </a:solidFill>
+                <a:latin typeface="+mn-lt"/>
+                <a:ea typeface="+mn-ea"/>
+                <a:cs typeface="+mn-cs"/>
+              </a:defRPr>
+            </a:lvl1pPr>
+            <a:lvl2pPr marL="685800" indent="-228600" algn="l" defTabSz="914400" rtl="0" eaLnBrk="1" latinLnBrk="0" hangingPunct="1">
+              <a:lnSpc>
+                <a:spcPct val="90000"/>
+              </a:lnSpc>
+              <a:spcBef>
+                <a:spcPts val="500"/>
+              </a:spcBef>
+              <a:buFont typeface="Arial" panose="020B0604020202020204" pitchFamily="34" charset="0"/>
+              <a:buChar char="•"/>
+              <a:defRPr sz="2400" kern="1200">
+                <a:solidFill>
+                  <a:schemeClr val="tx1"/>
+                </a:solidFill>
+                <a:latin typeface="+mn-lt"/>
+                <a:ea typeface="+mn-ea"/>
+                <a:cs typeface="+mn-cs"/>
+              </a:defRPr>
+            </a:lvl2pPr>
+            <a:lvl3pPr marL="1143000" indent="-228600" algn="l" defTabSz="914400" rtl="0" eaLnBrk="1" latinLnBrk="0" hangingPunct="1">
+              <a:lnSpc>
+                <a:spcPct val="90000"/>
+              </a:lnSpc>
+              <a:spcBef>
+                <a:spcPts val="500"/>
+              </a:spcBef>
+              <a:buFont typeface="Arial" panose="020B0604020202020204" pitchFamily="34" charset="0"/>
+              <a:buChar char="•"/>
+              <a:defRPr sz="2000" kern="1200">
+                <a:solidFill>
+                  <a:schemeClr val="tx1"/>
+                </a:solidFill>
+                <a:latin typeface="+mn-lt"/>
+                <a:ea typeface="+mn-ea"/>
+                <a:cs typeface="+mn-cs"/>
+              </a:defRPr>
+            </a:lvl3pPr>
+            <a:lvl4pPr marL="1600200" indent="-228600" algn="l" defTabSz="914400" rtl="0" eaLnBrk="1" latinLnBrk="0" hangingPunct="1">
+              <a:lnSpc>
+                <a:spcPct val="90000"/>
+              </a:lnSpc>
+              <a:spcBef>
+                <a:spcPts val="500"/>
+              </a:spcBef>
+              <a:buFont typeface="Arial" panose="020B0604020202020204" pitchFamily="34" charset="0"/>
+              <a:buChar char="•"/>
+              <a:defRPr sz="1800" kern="1200">
+                <a:solidFill>
+                  <a:schemeClr val="tx1"/>
+                </a:solidFill>
+                <a:latin typeface="+mn-lt"/>
+                <a:ea typeface="+mn-ea"/>
+                <a:cs typeface="+mn-cs"/>
+              </a:defRPr>
+            </a:lvl4pPr>
+            <a:lvl5pPr marL="2057400" indent="-228600" algn="l" defTabSz="914400" rtl="0" eaLnBrk="1" latinLnBrk="0" hangingPunct="1">
+              <a:lnSpc>
+                <a:spcPct val="90000"/>
+              </a:lnSpc>
+              <a:spcBef>
+                <a:spcPts val="500"/>
+              </a:spcBef>
+              <a:buFont typeface="Arial" panose="020B0604020202020204" pitchFamily="34" charset="0"/>
+              <a:buChar char="•"/>
+              <a:defRPr sz="1800" kern="1200">
+                <a:solidFill>
+                  <a:schemeClr val="tx1"/>
+                </a:solidFill>
+                <a:latin typeface="+mn-lt"/>
+                <a:ea typeface="+mn-ea"/>
+                <a:cs typeface="+mn-cs"/>
+              </a:defRPr>
+            </a:lvl5pPr>
+            <a:lvl6pPr marL="2514600" indent="-228600" algn="l" defTabSz="914400" rtl="0" eaLnBrk="1" latinLnBrk="0" hangingPunct="1">
+              <a:lnSpc>
+                <a:spcPct val="90000"/>
+              </a:lnSpc>
+              <a:spcBef>
+                <a:spcPts val="500"/>
+              </a:spcBef>
+              <a:buFont typeface="Arial" panose="020B0604020202020204" pitchFamily="34" charset="0"/>
+              <a:buChar char="•"/>
+              <a:defRPr sz="1800" kern="1200">
+                <a:solidFill>
+                  <a:schemeClr val="tx1"/>
+                </a:solidFill>
+                <a:latin typeface="+mn-lt"/>
+                <a:ea typeface="+mn-ea"/>
+                <a:cs typeface="+mn-cs"/>
+              </a:defRPr>
+            </a:lvl6pPr>
+            <a:lvl7pPr marL="2971800" indent="-228600" algn="l" defTabSz="914400" rtl="0" eaLnBrk="1" latinLnBrk="0" hangingPunct="1">
+              <a:lnSpc>
+                <a:spcPct val="90000"/>
+              </a:lnSpc>
+              <a:spcBef>
+                <a:spcPts val="500"/>
+              </a:spcBef>
+              <a:buFont typeface="Arial" panose="020B0604020202020204" pitchFamily="34" charset="0"/>
+              <a:buChar char="•"/>
+              <a:defRPr sz="1800" kern="1200">
+                <a:solidFill>
+                  <a:schemeClr val="tx1"/>
+                </a:solidFill>
+                <a:latin typeface="+mn-lt"/>
+                <a:ea typeface="+mn-ea"/>
+                <a:cs typeface="+mn-cs"/>
+              </a:defRPr>
+            </a:lvl7pPr>
+            <a:lvl8pPr marL="3429000" indent="-228600" algn="l" defTabSz="914400" rtl="0" eaLnBrk="1" latinLnBrk="0" hangingPunct="1">
+              <a:lnSpc>
+                <a:spcPct val="90000"/>
+              </a:lnSpc>
+              <a:spcBef>
+                <a:spcPts val="500"/>
+              </a:spcBef>
+              <a:buFont typeface="Arial" panose="020B0604020202020204" pitchFamily="34" charset="0"/>
+              <a:buChar char="•"/>
+              <a:defRPr sz="1800" kern="1200">
+                <a:solidFill>
+                  <a:schemeClr val="tx1"/>
+                </a:solidFill>
+                <a:latin typeface="+mn-lt"/>
+                <a:ea typeface="+mn-ea"/>
+                <a:cs typeface="+mn-cs"/>
+              </a:defRPr>
+            </a:lvl8pPr>
+            <a:lvl9pPr marL="3886200" indent="-228600" algn="l" defTabSz="914400" rtl="0" eaLnBrk="1" latinLnBrk="0" hangingPunct="1">
+              <a:lnSpc>
+                <a:spcPct val="90000"/>
+              </a:lnSpc>
+              <a:spcBef>
+                <a:spcPts val="500"/>
+              </a:spcBef>
+              <a:buFont typeface="Arial" panose="020B0604020202020204" pitchFamily="34" charset="0"/>
+              <a:buChar char="•"/>
+              <a:defRPr sz="1800" kern="1200">
+                <a:solidFill>
+                  <a:schemeClr val="tx1"/>
+                </a:solidFill>
+                <a:latin typeface="+mn-lt"/>
+                <a:ea typeface="+mn-ea"/>
+                <a:cs typeface="+mn-cs"/>
+              </a:defRPr>
+            </a:lvl9pPr>
+          </a:lstStyle>
           <a:p>
             <a:pPr algn="l"/>
             <a:endParaRPr lang="de-DE" dirty="0"/>

</xml_diff>

<commit_message>
Bild von Struktur ersetzt
das Bild ist unscharf trotzdem
</commit_message>
<xml_diff>
--- a/Medienverwaltungsdatenbank Gruppe1.pptx
+++ b/Medienverwaltungsdatenbank Gruppe1.pptx
@@ -14865,11 +14865,15 @@
         </p:spPr>
         <p:txBody>
           <a:bodyPr vert="horz" lIns="91440" tIns="45720" rIns="91440" bIns="45720" rtlCol="0" anchor="ctr">
-            <a:normAutofit fontScale="90000"/>
+            <a:noAutofit/>
           </a:bodyPr>
           <a:lstStyle/>
           <a:p>
-            <a:pPr algn="l"/>
+            <a:pPr algn="l">
+              <a:lnSpc>
+                <a:spcPct val="100000"/>
+              </a:lnSpc>
+            </a:pPr>
             <a:r>
               <a:rPr lang="en-US" sz="4000" b="1" dirty="0"/>
               <a:t>Projekt: </a:t>
@@ -14885,14 +14889,14 @@
               <a:rPr lang="en-US" sz="4000" b="1" dirty="0"/>
             </a:br>
             <a:r>
-              <a:rPr lang="en-US" sz="4000" b="1" dirty="0"/>
+              <a:rPr lang="en-US" sz="3600" b="1" dirty="0"/>
               <a:t>für </a:t>
             </a:r>
             <a:r>
-              <a:rPr lang="en-US" sz="4000" b="1" dirty="0" err="1"/>
+              <a:rPr lang="en-US" sz="3600" b="1" dirty="0" err="1"/>
               <a:t>Medienverwaltung</a:t>
             </a:r>
-            <a:endParaRPr lang="en-US" sz="4000" b="1" dirty="0"/>
+            <a:endParaRPr lang="en-US" sz="3600" b="1" dirty="0"/>
           </a:p>
         </p:txBody>
       </p:sp>
@@ -17629,10 +17633,10 @@
               <a:buAutoNum type="arabicPeriod"/>
             </a:pPr>
             <a:r>
-              <a:rPr lang="de-DE" b="1" dirty="0" err="1"/>
-              <a:t>view_master</a:t>
-            </a:r>
-            <a:endParaRPr lang="de-DE" b="1" dirty="0"/>
+              <a:rPr lang="de-DE" dirty="0" err="1"/>
+              <a:t>view_media_titles</a:t>
+            </a:r>
+            <a:endParaRPr lang="de-DE" dirty="0"/>
           </a:p>
           <a:p>
             <a:pPr marL="342900" indent="-342900">
@@ -17641,7 +17645,7 @@
             </a:pPr>
             <a:r>
               <a:rPr lang="de-DE" dirty="0" err="1"/>
-              <a:t>View_media_titles</a:t>
+              <a:t>view_films_details</a:t>
             </a:r>
             <a:endParaRPr lang="de-DE" dirty="0"/>
           </a:p>
@@ -17652,7 +17656,15 @@
             </a:pPr>
             <a:r>
               <a:rPr lang="de-DE" dirty="0" err="1"/>
-              <a:t>view_films_details</a:t>
+              <a:t>view</a:t>
+            </a:r>
+            <a:r>
+              <a:rPr lang="de-DE" dirty="0"/>
+              <a:t>_ </a:t>
+            </a:r>
+            <a:r>
+              <a:rPr lang="de-DE" dirty="0" err="1"/>
+              <a:t>book_details</a:t>
             </a:r>
             <a:endParaRPr lang="de-DE" dirty="0"/>
           </a:p>
@@ -17663,15 +17675,7 @@
             </a:pPr>
             <a:r>
               <a:rPr lang="de-DE" dirty="0" err="1"/>
-              <a:t>view</a:t>
-            </a:r>
-            <a:r>
-              <a:rPr lang="de-DE" dirty="0"/>
-              <a:t>_ </a:t>
-            </a:r>
-            <a:r>
-              <a:rPr lang="de-DE" dirty="0" err="1"/>
-              <a:t>book_details</a:t>
+              <a:t>view_music_details</a:t>
             </a:r>
             <a:endParaRPr lang="de-DE" dirty="0"/>
           </a:p>
@@ -17682,7 +17686,7 @@
             </a:pPr>
             <a:r>
               <a:rPr lang="de-DE" dirty="0" err="1"/>
-              <a:t>view_music_details</a:t>
+              <a:t>view_series_details</a:t>
             </a:r>
             <a:endParaRPr lang="de-DE" dirty="0"/>
           </a:p>
@@ -17692,8 +17696,8 @@
               <a:buAutoNum type="arabicPeriod"/>
             </a:pPr>
             <a:r>
-              <a:rPr lang="de-DE" dirty="0" err="1"/>
-              <a:t>view_series_details</a:t>
+              <a:rPr lang="de-DE" b="1" dirty="0" err="1"/>
+              <a:t>view_master</a:t>
             </a:r>
             <a:endParaRPr lang="de-DE" dirty="0"/>
           </a:p>
@@ -30738,42 +30742,6 @@
           </a:p>
         </p:txBody>
       </p:sp>
-      <p:pic>
-        <p:nvPicPr>
-          <p:cNvPr id="5" name="Grafik 4" descr="Ein Bild, das Screenshot, Text, Design enthält.&#10;&#10;Automatisch generierte Beschreibung">
-            <a:extLst>
-              <a:ext uri="{FF2B5EF4-FFF2-40B4-BE49-F238E27FC236}">
-                <a16:creationId xmlns:a16="http://schemas.microsoft.com/office/drawing/2014/main" id="{2B0C4DCA-D669-80BE-EE9B-28B93AEBABF4}"/>
-              </a:ext>
-            </a:extLst>
-          </p:cNvPr>
-          <p:cNvPicPr>
-            <a:picLocks noChangeAspect="1"/>
-          </p:cNvPicPr>
-          <p:nvPr/>
-        </p:nvPicPr>
-        <p:blipFill>
-          <a:blip r:embed="rId3">
-            <a:extLst>
-              <a:ext uri="{28A0092B-C50C-407E-A947-70E740481C1C}">
-                <a14:useLocalDpi xmlns:a14="http://schemas.microsoft.com/office/drawing/2010/main" val="0"/>
-              </a:ext>
-            </a:extLst>
-          </a:blip>
-          <a:stretch>
-            <a:fillRect/>
-          </a:stretch>
-        </p:blipFill>
-        <p:spPr>
-          <a:xfrm>
-            <a:off x="2944948" y="1841670"/>
-            <a:ext cx="6316282" cy="4313690"/>
-          </a:xfrm>
-          <a:prstGeom prst="rect">
-            <a:avLst/>
-          </a:prstGeom>
-        </p:spPr>
-      </p:pic>
       <p:sp>
         <p:nvSpPr>
           <p:cNvPr id="7" name="Rechteck 6">
@@ -31185,6 +31153,42 @@
           </a:p>
         </p:txBody>
       </p:sp>
+      <p:pic>
+        <p:nvPicPr>
+          <p:cNvPr id="6" name="Grafik 5" descr="Ein Bild, das Text, Screenshot, Diagramm, Zahl enthält.&#10;&#10;Automatisch generierte Beschreibung">
+            <a:extLst>
+              <a:ext uri="{FF2B5EF4-FFF2-40B4-BE49-F238E27FC236}">
+                <a16:creationId xmlns:a16="http://schemas.microsoft.com/office/drawing/2014/main" id="{4F444CEB-F186-BB51-E667-4A86F1B3E114}"/>
+              </a:ext>
+            </a:extLst>
+          </p:cNvPr>
+          <p:cNvPicPr>
+            <a:picLocks noChangeAspect="1"/>
+          </p:cNvPicPr>
+          <p:nvPr/>
+        </p:nvPicPr>
+        <p:blipFill>
+          <a:blip r:embed="rId3">
+            <a:extLst>
+              <a:ext uri="{28A0092B-C50C-407E-A947-70E740481C1C}">
+                <a14:useLocalDpi xmlns:a14="http://schemas.microsoft.com/office/drawing/2010/main" val="0"/>
+              </a:ext>
+            </a:extLst>
+          </a:blip>
+          <a:stretch>
+            <a:fillRect/>
+          </a:stretch>
+        </p:blipFill>
+        <p:spPr>
+          <a:xfrm>
+            <a:off x="2803261" y="1612232"/>
+            <a:ext cx="6585477" cy="4446750"/>
+          </a:xfrm>
+          <a:prstGeom prst="rect">
+            <a:avLst/>
+          </a:prstGeom>
+        </p:spPr>
+      </p:pic>
     </p:spTree>
     <p:extLst>
       <p:ext uri="{BB962C8B-B14F-4D97-AF65-F5344CB8AC3E}">
@@ -31301,8 +31305,8 @@
         </p:blipFill>
         <p:spPr>
           <a:xfrm>
-            <a:off x="6400800" y="1217304"/>
-            <a:ext cx="4655640" cy="4876436"/>
+            <a:off x="6612735" y="1600200"/>
+            <a:ext cx="3853582" cy="4036340"/>
           </a:xfrm>
           <a:prstGeom prst="rect">
             <a:avLst/>
@@ -31603,8 +31607,8 @@
         </p:blipFill>
         <p:spPr>
           <a:xfrm>
-            <a:off x="748400" y="1934561"/>
-            <a:ext cx="5211548" cy="2973308"/>
+            <a:off x="1105193" y="2127043"/>
+            <a:ext cx="4969348" cy="2835127"/>
           </a:xfrm>
           <a:prstGeom prst="rect">
             <a:avLst/>

</xml_diff>

<commit_message>
Text reduziert, Folie 3
</commit_message>
<xml_diff>
--- a/Medienverwaltungsdatenbank Gruppe1.pptx
+++ b/Medienverwaltungsdatenbank Gruppe1.pptx
@@ -3492,7 +3492,7 @@
                 <a:ea typeface="Roboto" pitchFamily="34" charset="-122"/>
                 <a:cs typeface="Roboto" pitchFamily="34" charset="-120"/>
               </a:rPr>
-              <a:t>, </a:t>
+              <a:t> und </a:t>
             </a:r>
             <a:r>
               <a:rPr lang="en-US" sz="1200" dirty="0" err="1">
@@ -3503,7 +3503,7 @@
                 <a:ea typeface="Roboto" pitchFamily="34" charset="-122"/>
                 <a:cs typeface="Roboto" pitchFamily="34" charset="-120"/>
               </a:rPr>
-              <a:t>Sichten</a:t>
+              <a:t>zukünftige</a:t>
             </a:r>
             <a:r>
               <a:rPr lang="en-US" sz="1200" dirty="0">
@@ -3514,7 +3514,7 @@
                 <a:ea typeface="Roboto" pitchFamily="34" charset="-122"/>
                 <a:cs typeface="Roboto" pitchFamily="34" charset="-120"/>
               </a:rPr>
-              <a:t> und </a:t>
+              <a:t> </a:t>
             </a:r>
             <a:r>
               <a:rPr lang="en-US" sz="1200" dirty="0" err="1">
@@ -3525,7 +3525,7 @@
                 <a:ea typeface="Roboto" pitchFamily="34" charset="-122"/>
                 <a:cs typeface="Roboto" pitchFamily="34" charset="-120"/>
               </a:rPr>
-              <a:t>Funktionen</a:t>
+              <a:t>Erweiterungen</a:t>
             </a:r>
             <a:r>
               <a:rPr lang="en-US" sz="1200" dirty="0">
@@ -3548,182 +3548,6 @@
                 <a:cs typeface="Roboto" pitchFamily="34" charset="-120"/>
               </a:rPr>
               <a:t>erläutern</a:t>
-            </a:r>
-            <a:r>
-              <a:rPr lang="en-US" sz="1200" dirty="0">
-                <a:solidFill>
-                  <a:srgbClr val="3C3939"/>
-                </a:solidFill>
-                <a:latin typeface="Roboto" pitchFamily="34" charset="0"/>
-                <a:ea typeface="Roboto" pitchFamily="34" charset="-122"/>
-                <a:cs typeface="Roboto" pitchFamily="34" charset="-120"/>
-              </a:rPr>
-              <a:t>. </a:t>
-            </a:r>
-            <a:r>
-              <a:rPr lang="en-US" sz="1200" dirty="0" err="1">
-                <a:solidFill>
-                  <a:srgbClr val="3C3939"/>
-                </a:solidFill>
-                <a:latin typeface="Roboto" pitchFamily="34" charset="0"/>
-                <a:ea typeface="Roboto" pitchFamily="34" charset="-122"/>
-                <a:cs typeface="Roboto" pitchFamily="34" charset="-120"/>
-              </a:rPr>
-              <a:t>Außerdem</a:t>
-            </a:r>
-            <a:r>
-              <a:rPr lang="en-US" sz="1200" dirty="0">
-                <a:solidFill>
-                  <a:srgbClr val="3C3939"/>
-                </a:solidFill>
-                <a:latin typeface="Roboto" pitchFamily="34" charset="0"/>
-                <a:ea typeface="Roboto" pitchFamily="34" charset="-122"/>
-                <a:cs typeface="Roboto" pitchFamily="34" charset="-120"/>
-              </a:rPr>
-              <a:t> </a:t>
-            </a:r>
-            <a:r>
-              <a:rPr lang="en-US" sz="1200" dirty="0" err="1">
-                <a:solidFill>
-                  <a:srgbClr val="3C3939"/>
-                </a:solidFill>
-                <a:latin typeface="Roboto" pitchFamily="34" charset="0"/>
-                <a:ea typeface="Roboto" pitchFamily="34" charset="-122"/>
-                <a:cs typeface="Roboto" pitchFamily="34" charset="-120"/>
-              </a:rPr>
-              <a:t>gehen</a:t>
-            </a:r>
-            <a:r>
-              <a:rPr lang="en-US" sz="1200" dirty="0">
-                <a:solidFill>
-                  <a:srgbClr val="3C3939"/>
-                </a:solidFill>
-                <a:latin typeface="Roboto" pitchFamily="34" charset="0"/>
-                <a:ea typeface="Roboto" pitchFamily="34" charset="-122"/>
-                <a:cs typeface="Roboto" pitchFamily="34" charset="-120"/>
-              </a:rPr>
-              <a:t> </a:t>
-            </a:r>
-            <a:r>
-              <a:rPr lang="en-US" sz="1200" dirty="0" err="1">
-                <a:solidFill>
-                  <a:srgbClr val="3C3939"/>
-                </a:solidFill>
-                <a:latin typeface="Roboto" pitchFamily="34" charset="0"/>
-                <a:ea typeface="Roboto" pitchFamily="34" charset="-122"/>
-                <a:cs typeface="Roboto" pitchFamily="34" charset="-120"/>
-              </a:rPr>
-              <a:t>wir</a:t>
-            </a:r>
-            <a:r>
-              <a:rPr lang="en-US" sz="1200" dirty="0">
-                <a:solidFill>
-                  <a:srgbClr val="3C3939"/>
-                </a:solidFill>
-                <a:latin typeface="Roboto" pitchFamily="34" charset="0"/>
-                <a:ea typeface="Roboto" pitchFamily="34" charset="-122"/>
-                <a:cs typeface="Roboto" pitchFamily="34" charset="-120"/>
-              </a:rPr>
-              <a:t> auf die </a:t>
-            </a:r>
-            <a:r>
-              <a:rPr lang="en-US" sz="1200" dirty="0" err="1">
-                <a:solidFill>
-                  <a:srgbClr val="3C3939"/>
-                </a:solidFill>
-                <a:latin typeface="Roboto" pitchFamily="34" charset="0"/>
-                <a:ea typeface="Roboto" pitchFamily="34" charset="-122"/>
-                <a:cs typeface="Roboto" pitchFamily="34" charset="-120"/>
-              </a:rPr>
-              <a:t>Schnittstellen</a:t>
-            </a:r>
-            <a:r>
-              <a:rPr lang="en-US" sz="1200" dirty="0">
-                <a:solidFill>
-                  <a:srgbClr val="3C3939"/>
-                </a:solidFill>
-                <a:latin typeface="Roboto" pitchFamily="34" charset="0"/>
-                <a:ea typeface="Roboto" pitchFamily="34" charset="-122"/>
-                <a:cs typeface="Roboto" pitchFamily="34" charset="-120"/>
-              </a:rPr>
-              <a:t> und den </a:t>
-            </a:r>
-            <a:r>
-              <a:rPr lang="en-US" sz="1200" dirty="0" err="1">
-                <a:solidFill>
-                  <a:srgbClr val="3C3939"/>
-                </a:solidFill>
-                <a:latin typeface="Roboto" pitchFamily="34" charset="0"/>
-                <a:ea typeface="Roboto" pitchFamily="34" charset="-122"/>
-                <a:cs typeface="Roboto" pitchFamily="34" charset="-120"/>
-              </a:rPr>
-              <a:t>Ausblick</a:t>
-            </a:r>
-            <a:r>
-              <a:rPr lang="en-US" sz="1200" dirty="0">
-                <a:solidFill>
-                  <a:srgbClr val="3C3939"/>
-                </a:solidFill>
-                <a:latin typeface="Roboto" pitchFamily="34" charset="0"/>
-                <a:ea typeface="Roboto" pitchFamily="34" charset="-122"/>
-                <a:cs typeface="Roboto" pitchFamily="34" charset="-120"/>
-              </a:rPr>
-              <a:t> auf </a:t>
-            </a:r>
-            <a:r>
-              <a:rPr lang="en-US" sz="1200" dirty="0" err="1">
-                <a:solidFill>
-                  <a:srgbClr val="3C3939"/>
-                </a:solidFill>
-                <a:latin typeface="Roboto" pitchFamily="34" charset="0"/>
-                <a:ea typeface="Roboto" pitchFamily="34" charset="-122"/>
-                <a:cs typeface="Roboto" pitchFamily="34" charset="-120"/>
-              </a:rPr>
-              <a:t>zukünftige</a:t>
-            </a:r>
-            <a:r>
-              <a:rPr lang="en-US" sz="1200" dirty="0">
-                <a:solidFill>
-                  <a:srgbClr val="3C3939"/>
-                </a:solidFill>
-                <a:latin typeface="Roboto" pitchFamily="34" charset="0"/>
-                <a:ea typeface="Roboto" pitchFamily="34" charset="-122"/>
-                <a:cs typeface="Roboto" pitchFamily="34" charset="-120"/>
-              </a:rPr>
-              <a:t> </a:t>
-            </a:r>
-            <a:r>
-              <a:rPr lang="en-US" sz="1200" dirty="0" err="1">
-                <a:solidFill>
-                  <a:srgbClr val="3C3939"/>
-                </a:solidFill>
-                <a:latin typeface="Roboto" pitchFamily="34" charset="0"/>
-                <a:ea typeface="Roboto" pitchFamily="34" charset="-122"/>
-                <a:cs typeface="Roboto" pitchFamily="34" charset="-120"/>
-              </a:rPr>
-              <a:t>Erweiterungen</a:t>
-            </a:r>
-            <a:r>
-              <a:rPr lang="en-US" sz="1200" dirty="0">
-                <a:solidFill>
-                  <a:srgbClr val="3C3939"/>
-                </a:solidFill>
-                <a:latin typeface="Roboto" pitchFamily="34" charset="0"/>
-                <a:ea typeface="Roboto" pitchFamily="34" charset="-122"/>
-                <a:cs typeface="Roboto" pitchFamily="34" charset="-120"/>
-              </a:rPr>
-              <a:t> </a:t>
-            </a:r>
-            <a:r>
-              <a:rPr lang="en-US" sz="1200" dirty="0" err="1">
-                <a:solidFill>
-                  <a:srgbClr val="3C3939"/>
-                </a:solidFill>
-                <a:latin typeface="Roboto" pitchFamily="34" charset="0"/>
-                <a:ea typeface="Roboto" pitchFamily="34" charset="-122"/>
-                <a:cs typeface="Roboto" pitchFamily="34" charset="-120"/>
-              </a:rPr>
-              <a:t>ein</a:t>
             </a:r>
             <a:r>
               <a:rPr lang="en-US" sz="1200" dirty="0">
@@ -5388,8 +5212,6 @@
               <a:rPr lang="de-DE" dirty="0"/>
               <a:t>.</a:t>
             </a:r>
-          </a:p>
-          <a:p>
             <a:endParaRPr lang="en-US" sz="1200" dirty="0">
               <a:solidFill>
                 <a:srgbClr val="3C3939"/>
@@ -25337,8 +25159,8 @@
         </p:nvSpPr>
         <p:spPr>
           <a:xfrm>
-            <a:off x="1621990" y="1809106"/>
-            <a:ext cx="5731933" cy="4636690"/>
+            <a:off x="1627563" y="1981200"/>
+            <a:ext cx="5769409" cy="3211050"/>
           </a:xfrm>
         </p:spPr>
         <p:txBody>
@@ -25452,7 +25274,7 @@
         </p:blipFill>
         <p:spPr>
           <a:xfrm>
-            <a:off x="7950768" y="1739519"/>
+            <a:off x="7706486" y="1987178"/>
             <a:ext cx="3211050" cy="3211050"/>
           </a:xfrm>
           <a:prstGeom prst="rect">
@@ -28760,239 +28582,6 @@
           </a:p>
         </p:txBody>
       </p:sp>
-      <p:sp>
-        <p:nvSpPr>
-          <p:cNvPr id="23" name="Textplatzhalter 8">
-            <a:extLst>
-              <a:ext uri="{FF2B5EF4-FFF2-40B4-BE49-F238E27FC236}">
-                <a16:creationId xmlns:a16="http://schemas.microsoft.com/office/drawing/2014/main" id="{D9C66708-EB0C-A2EF-CAE8-B7733B5A24C2}"/>
-              </a:ext>
-            </a:extLst>
-          </p:cNvPr>
-          <p:cNvSpPr txBox="1">
-            <a:spLocks/>
-          </p:cNvSpPr>
-          <p:nvPr/>
-        </p:nvSpPr>
-        <p:spPr>
-          <a:xfrm>
-            <a:off x="1752600" y="2526999"/>
-            <a:ext cx="10972800" cy="609600"/>
-          </a:xfrm>
-          <a:prstGeom prst="rect">
-            <a:avLst/>
-          </a:prstGeom>
-        </p:spPr>
-        <p:txBody>
-          <a:bodyPr vert="horz" lIns="91440" tIns="45720" rIns="91440" bIns="45720" rtlCol="0">
-            <a:noAutofit/>
-          </a:bodyPr>
-          <a:lstStyle>
-            <a:lvl1pPr marL="0" indent="0" algn="ctr" defTabSz="914400" rtl="0" eaLnBrk="1" latinLnBrk="0" hangingPunct="1">
-              <a:lnSpc>
-                <a:spcPct val="90000"/>
-              </a:lnSpc>
-              <a:spcBef>
-                <a:spcPts val="1000"/>
-              </a:spcBef>
-              <a:buFont typeface="Arial" panose="020B0604020202020204" pitchFamily="34" charset="0"/>
-              <a:buNone/>
-              <a:tabLst/>
-              <a:defRPr sz="3200" u="sng" kern="1200">
-                <a:solidFill>
-                  <a:schemeClr val="tx1"/>
-                </a:solidFill>
-                <a:latin typeface="+mn-lt"/>
-                <a:ea typeface="+mn-ea"/>
-                <a:cs typeface="+mn-cs"/>
-              </a:defRPr>
-            </a:lvl1pPr>
-            <a:lvl2pPr marL="685800" indent="-228600" algn="l" defTabSz="914400" rtl="0" eaLnBrk="1" latinLnBrk="0" hangingPunct="1">
-              <a:lnSpc>
-                <a:spcPct val="90000"/>
-              </a:lnSpc>
-              <a:spcBef>
-                <a:spcPts val="500"/>
-              </a:spcBef>
-              <a:buFont typeface="Arial" panose="020B0604020202020204" pitchFamily="34" charset="0"/>
-              <a:buChar char="•"/>
-              <a:defRPr sz="2400" kern="1200">
-                <a:solidFill>
-                  <a:schemeClr val="tx1"/>
-                </a:solidFill>
-                <a:latin typeface="+mn-lt"/>
-                <a:ea typeface="+mn-ea"/>
-                <a:cs typeface="+mn-cs"/>
-              </a:defRPr>
-            </a:lvl2pPr>
-            <a:lvl3pPr marL="1143000" indent="-228600" algn="l" defTabSz="914400" rtl="0" eaLnBrk="1" latinLnBrk="0" hangingPunct="1">
-              <a:lnSpc>
-                <a:spcPct val="90000"/>
-              </a:lnSpc>
-              <a:spcBef>
-                <a:spcPts val="500"/>
-              </a:spcBef>
-              <a:buFont typeface="Arial" panose="020B0604020202020204" pitchFamily="34" charset="0"/>
-              <a:buChar char="•"/>
-              <a:defRPr sz="2000" kern="1200">
-                <a:solidFill>
-                  <a:schemeClr val="tx1"/>
-                </a:solidFill>
-                <a:latin typeface="+mn-lt"/>
-                <a:ea typeface="+mn-ea"/>
-                <a:cs typeface="+mn-cs"/>
-              </a:defRPr>
-            </a:lvl3pPr>
-            <a:lvl4pPr marL="1600200" indent="-228600" algn="l" defTabSz="914400" rtl="0" eaLnBrk="1" latinLnBrk="0" hangingPunct="1">
-              <a:lnSpc>
-                <a:spcPct val="90000"/>
-              </a:lnSpc>
-              <a:spcBef>
-                <a:spcPts val="500"/>
-              </a:spcBef>
-              <a:buFont typeface="Arial" panose="020B0604020202020204" pitchFamily="34" charset="0"/>
-              <a:buChar char="•"/>
-              <a:defRPr sz="1800" kern="1200">
-                <a:solidFill>
-                  <a:schemeClr val="tx1"/>
-                </a:solidFill>
-                <a:latin typeface="+mn-lt"/>
-                <a:ea typeface="+mn-ea"/>
-                <a:cs typeface="+mn-cs"/>
-              </a:defRPr>
-            </a:lvl4pPr>
-            <a:lvl5pPr marL="2057400" indent="-228600" algn="l" defTabSz="914400" rtl="0" eaLnBrk="1" latinLnBrk="0" hangingPunct="1">
-              <a:lnSpc>
-                <a:spcPct val="90000"/>
-              </a:lnSpc>
-              <a:spcBef>
-                <a:spcPts val="500"/>
-              </a:spcBef>
-              <a:buFont typeface="Arial" panose="020B0604020202020204" pitchFamily="34" charset="0"/>
-              <a:buChar char="•"/>
-              <a:defRPr sz="1800" kern="1200">
-                <a:solidFill>
-                  <a:schemeClr val="tx1"/>
-                </a:solidFill>
-                <a:latin typeface="+mn-lt"/>
-                <a:ea typeface="+mn-ea"/>
-                <a:cs typeface="+mn-cs"/>
-              </a:defRPr>
-            </a:lvl5pPr>
-            <a:lvl6pPr marL="2514600" indent="-228600" algn="l" defTabSz="914400" rtl="0" eaLnBrk="1" latinLnBrk="0" hangingPunct="1">
-              <a:lnSpc>
-                <a:spcPct val="90000"/>
-              </a:lnSpc>
-              <a:spcBef>
-                <a:spcPts val="500"/>
-              </a:spcBef>
-              <a:buFont typeface="Arial" panose="020B0604020202020204" pitchFamily="34" charset="0"/>
-              <a:buChar char="•"/>
-              <a:defRPr sz="1800" kern="1200">
-                <a:solidFill>
-                  <a:schemeClr val="tx1"/>
-                </a:solidFill>
-                <a:latin typeface="+mn-lt"/>
-                <a:ea typeface="+mn-ea"/>
-                <a:cs typeface="+mn-cs"/>
-              </a:defRPr>
-            </a:lvl6pPr>
-            <a:lvl7pPr marL="2971800" indent="-228600" algn="l" defTabSz="914400" rtl="0" eaLnBrk="1" latinLnBrk="0" hangingPunct="1">
-              <a:lnSpc>
-                <a:spcPct val="90000"/>
-              </a:lnSpc>
-              <a:spcBef>
-                <a:spcPts val="500"/>
-              </a:spcBef>
-              <a:buFont typeface="Arial" panose="020B0604020202020204" pitchFamily="34" charset="0"/>
-              <a:buChar char="•"/>
-              <a:defRPr sz="1800" kern="1200">
-                <a:solidFill>
-                  <a:schemeClr val="tx1"/>
-                </a:solidFill>
-                <a:latin typeface="+mn-lt"/>
-                <a:ea typeface="+mn-ea"/>
-                <a:cs typeface="+mn-cs"/>
-              </a:defRPr>
-            </a:lvl7pPr>
-            <a:lvl8pPr marL="3429000" indent="-228600" algn="l" defTabSz="914400" rtl="0" eaLnBrk="1" latinLnBrk="0" hangingPunct="1">
-              <a:lnSpc>
-                <a:spcPct val="90000"/>
-              </a:lnSpc>
-              <a:spcBef>
-                <a:spcPts val="500"/>
-              </a:spcBef>
-              <a:buFont typeface="Arial" panose="020B0604020202020204" pitchFamily="34" charset="0"/>
-              <a:buChar char="•"/>
-              <a:defRPr sz="1800" kern="1200">
-                <a:solidFill>
-                  <a:schemeClr val="tx1"/>
-                </a:solidFill>
-                <a:latin typeface="+mn-lt"/>
-                <a:ea typeface="+mn-ea"/>
-                <a:cs typeface="+mn-cs"/>
-              </a:defRPr>
-            </a:lvl8pPr>
-            <a:lvl9pPr marL="3886200" indent="-228600" algn="l" defTabSz="914400" rtl="0" eaLnBrk="1" latinLnBrk="0" hangingPunct="1">
-              <a:lnSpc>
-                <a:spcPct val="90000"/>
-              </a:lnSpc>
-              <a:spcBef>
-                <a:spcPts val="500"/>
-              </a:spcBef>
-              <a:buFont typeface="Arial" panose="020B0604020202020204" pitchFamily="34" charset="0"/>
-              <a:buChar char="•"/>
-              <a:defRPr sz="1800" kern="1200">
-                <a:solidFill>
-                  <a:schemeClr val="tx1"/>
-                </a:solidFill>
-                <a:latin typeface="+mn-lt"/>
-                <a:ea typeface="+mn-ea"/>
-                <a:cs typeface="+mn-cs"/>
-              </a:defRPr>
-            </a:lvl9pPr>
-          </a:lstStyle>
-          <a:p>
-            <a:pPr marL="571500" indent="-571500" algn="l">
-              <a:buFont typeface="Arial" panose="020B0604020202020204" pitchFamily="34" charset="0"/>
-              <a:buChar char="•"/>
-            </a:pPr>
-            <a:r>
-              <a:rPr lang="de-DE" sz="3600" u="none" dirty="0">
-                <a:latin typeface="+mj-lt"/>
-              </a:rPr>
-              <a:t>IST-Situation</a:t>
-            </a:r>
-          </a:p>
-          <a:p>
-            <a:pPr marL="571500" indent="-571500" algn="l">
-              <a:buFont typeface="Arial" panose="020B0604020202020204" pitchFamily="34" charset="0"/>
-              <a:buChar char="•"/>
-            </a:pPr>
-            <a:r>
-              <a:rPr lang="de-DE" sz="3600" u="none" dirty="0">
-                <a:latin typeface="+mj-lt"/>
-              </a:rPr>
-              <a:t>Soll-Situation</a:t>
-            </a:r>
-          </a:p>
-          <a:p>
-            <a:pPr marL="571500" indent="-571500" algn="l">
-              <a:buFont typeface="Arial" panose="020B0604020202020204" pitchFamily="34" charset="0"/>
-              <a:buChar char="•"/>
-            </a:pPr>
-            <a:r>
-              <a:rPr lang="de-DE" sz="3600" u="none" dirty="0">
-                <a:latin typeface="+mj-lt"/>
-              </a:rPr>
-              <a:t>Konzept</a:t>
-            </a:r>
-            <a:endParaRPr lang="de-DE" sz="3600" dirty="0">
-              <a:latin typeface="+mj-lt"/>
-            </a:endParaRPr>
-          </a:p>
-        </p:txBody>
-      </p:sp>
       <p:pic>
         <p:nvPicPr>
           <p:cNvPr id="24" name="Picture 2" descr="Imágenes de Soll-Ist-Vergleich: descubre bancos de fotos, ilustraciones ...">
@@ -29022,7 +28611,7 @@
         </p:blipFill>
         <p:spPr bwMode="auto">
           <a:xfrm>
-            <a:off x="6294521" y="1768425"/>
+            <a:off x="3448050" y="1885376"/>
             <a:ext cx="5295900" cy="3429000"/>
           </a:xfrm>
           <a:prstGeom prst="rect">

</xml_diff>